<commit_message>
Update documents/slides/java/Bai 2- Constructor trong Java va huong dan su dung Maven tool.pptx
</commit_message>
<xml_diff>
--- a/documents/slides/java/Bai 2- Constructor trong Java va huong dan su dung Maven tool.pptx
+++ b/documents/slides/java/Bai 2- Constructor trong Java va huong dan su dung Maven tool.pptx
@@ -8175,36 +8175,36 @@
               <a:t> </a:t>
             </a:r>
             <a:r>
-              <a:rPr lang="en-US" dirty="0" err="1"/>
-              <a:t>trả</a:t>
-            </a:r>
-            <a:r>
-              <a:rPr lang="en-US" dirty="0"/>
-              <a:t> </a:t>
-            </a:r>
-            <a:r>
-              <a:rPr lang="en-US" dirty="0" err="1"/>
-              <a:t>về</a:t>
-            </a:r>
-            <a:r>
-              <a:rPr lang="en-US" dirty="0"/>
-              <a:t> </a:t>
-            </a:r>
-            <a:r>
-              <a:rPr lang="en-US" dirty="0" err="1"/>
+              <a:rPr lang="en-US" dirty="0" err="1" smtClean="0"/>
               <a:t>rõ</a:t>
             </a:r>
             <a:r>
-              <a:rPr lang="en-US" dirty="0"/>
-              <a:t> </a:t>
-            </a:r>
-            <a:r>
-              <a:rPr lang="en-US" dirty="0" smtClean="0"/>
-              <a:t>rang: </a:t>
-            </a:r>
-            <a:r>
-              <a:rPr lang="en-US" dirty="0" err="1" smtClean="0"/>
-              <a:t>voild</a:t>
+              <a:rPr lang="en-US" dirty="0" smtClean="0"/>
+              <a:t> rang </a:t>
+            </a:r>
+            <a:r>
+              <a:rPr lang="en-US" dirty="0" err="1" smtClean="0"/>
+              <a:t>cho</a:t>
+            </a:r>
+            <a:r>
+              <a:rPr lang="en-US" dirty="0" smtClean="0"/>
+              <a:t> </a:t>
+            </a:r>
+            <a:r>
+              <a:rPr lang="en-US" dirty="0" err="1" smtClean="0"/>
+              <a:t>đối</a:t>
+            </a:r>
+            <a:r>
+              <a:rPr lang="en-US" dirty="0" smtClean="0"/>
+              <a:t> </a:t>
+            </a:r>
+            <a:r>
+              <a:rPr lang="en-US" dirty="0" err="1" smtClean="0"/>
+              <a:t>số</a:t>
+            </a:r>
+            <a:r>
+              <a:rPr lang="en-US" dirty="0" smtClean="0"/>
+              <a:t>: void</a:t>
             </a:r>
             <a:r>
               <a:rPr lang="en-US" dirty="0" smtClean="0"/>
@@ -8212,11 +8212,15 @@
             </a:r>
             <a:r>
               <a:rPr lang="en-US" dirty="0" err="1" smtClean="0"/>
-              <a:t>init</a:t>
-            </a:r>
-            <a:r>
-              <a:rPr lang="en-US" dirty="0" smtClean="0"/>
-              <a:t> …</a:t>
+              <a:t>int</a:t>
+            </a:r>
+            <a:r>
+              <a:rPr lang="en-US" dirty="0" smtClean="0"/>
+              <a:t> </a:t>
+            </a:r>
+            <a:r>
+              <a:rPr lang="en-US" dirty="0" smtClean="0"/>
+              <a:t>…</a:t>
             </a:r>
             <a:endParaRPr lang="en-US" dirty="0"/>
           </a:p>

</xml_diff>